<commit_message>
start working on add-form and view-form
</commit_message>
<xml_diff>
--- a/Reimbursement Services PPT.pptx
+++ b/Reimbursement Services PPT.pptx
@@ -5,7 +5,7 @@
     <p:sldMasterId id="2147483706" r:id="rId1"/>
   </p:sldMasterIdLst>
   <p:notesMasterIdLst>
-    <p:notesMasterId r:id="rId18"/>
+    <p:notesMasterId r:id="rId19"/>
   </p:notesMasterIdLst>
   <p:sldIdLst>
     <p:sldId id="256" r:id="rId2"/>
@@ -18,12 +18,13 @@
     <p:sldId id="266" r:id="rId9"/>
     <p:sldId id="265" r:id="rId10"/>
     <p:sldId id="269" r:id="rId11"/>
-    <p:sldId id="264" r:id="rId12"/>
-    <p:sldId id="270" r:id="rId13"/>
-    <p:sldId id="271" r:id="rId14"/>
-    <p:sldId id="272" r:id="rId15"/>
-    <p:sldId id="273" r:id="rId16"/>
-    <p:sldId id="260" r:id="rId17"/>
+    <p:sldId id="274" r:id="rId12"/>
+    <p:sldId id="264" r:id="rId13"/>
+    <p:sldId id="270" r:id="rId14"/>
+    <p:sldId id="271" r:id="rId15"/>
+    <p:sldId id="272" r:id="rId16"/>
+    <p:sldId id="273" r:id="rId17"/>
+    <p:sldId id="260" r:id="rId18"/>
   </p:sldIdLst>
   <p:sldSz cx="10080625" cy="7559675"/>
   <p:notesSz cx="7559675" cy="10691813"/>
@@ -2088,7 +2089,7 @@
                   <a:spcPct val="0"/>
                 </a:spcAft>
               </a:pPr>
-              <a:t>11</a:t>
+              <a:t>12</a:t>
             </a:fld>
             <a:endParaRPr lang="en-IN" altLang="en-US" sz="1400"/>
           </a:p>
@@ -2538,7 +2539,7 @@
                   <a:spcPct val="0"/>
                 </a:spcAft>
               </a:pPr>
-              <a:t>16</a:t>
+              <a:t>17</a:t>
             </a:fld>
             <a:endParaRPr lang="en-IN" altLang="en-US" sz="1400"/>
           </a:p>
@@ -3012,8 +3013,8 @@
         </p:nvSpPr>
         <p:spPr>
           <a:xfrm>
-            <a:off x="215900" y="812800"/>
-            <a:ext cx="7127875" cy="4008438"/>
+            <a:off x="1106488" y="812800"/>
+            <a:ext cx="5346700" cy="4008438"/>
           </a:xfrm>
           <a:solidFill>
             <a:srgbClr val="FFFFFF"/>
@@ -7135,7 +7136,7 @@
               <a:pPr>
                 <a:defRPr/>
               </a:pPr>
-              <a:t>10/14/22</a:t>
+              <a:t>11/11/22</a:t>
             </a:fld>
             <a:endParaRPr lang="en-US" dirty="0"/>
           </a:p>
@@ -7427,7 +7428,7 @@
               <a:pPr>
                 <a:defRPr/>
               </a:pPr>
-              <a:t>10/14/22</a:t>
+              <a:t>11/11/22</a:t>
             </a:fld>
             <a:endParaRPr lang="en-US" dirty="0"/>
           </a:p>
@@ -7886,7 +7887,7 @@
               <a:pPr>
                 <a:defRPr/>
               </a:pPr>
-              <a:t>10/14/22</a:t>
+              <a:t>11/11/22</a:t>
             </a:fld>
             <a:endParaRPr lang="en-US" dirty="0"/>
           </a:p>
@@ -8178,7 +8179,7 @@
               <a:pPr>
                 <a:defRPr/>
               </a:pPr>
-              <a:t>10/14/22</a:t>
+              <a:t>11/11/22</a:t>
             </a:fld>
             <a:endParaRPr lang="en-US" dirty="0"/>
           </a:p>
@@ -8637,7 +8638,7 @@
               <a:pPr>
                 <a:defRPr/>
               </a:pPr>
-              <a:t>10/14/22</a:t>
+              <a:t>11/11/22</a:t>
             </a:fld>
             <a:endParaRPr lang="en-US" dirty="0"/>
           </a:p>
@@ -8989,7 +8990,7 @@
               <a:pPr>
                 <a:defRPr/>
               </a:pPr>
-              <a:t>10/14/22</a:t>
+              <a:t>11/11/22</a:t>
             </a:fld>
             <a:endParaRPr lang="en-US" dirty="0"/>
           </a:p>
@@ -9204,7 +9205,7 @@
               <a:pPr>
                 <a:defRPr/>
               </a:pPr>
-              <a:t>10/14/22</a:t>
+              <a:t>11/11/22</a:t>
             </a:fld>
             <a:endParaRPr lang="en-US" dirty="0"/>
           </a:p>
@@ -9429,7 +9430,7 @@
               <a:pPr>
                 <a:defRPr/>
               </a:pPr>
-              <a:t>10/14/22</a:t>
+              <a:t>11/11/22</a:t>
             </a:fld>
             <a:endParaRPr lang="en-US" dirty="0"/>
           </a:p>
@@ -9648,7 +9649,7 @@
               <a:pPr>
                 <a:defRPr/>
               </a:pPr>
-              <a:t>10/14/22</a:t>
+              <a:t>11/11/22</a:t>
             </a:fld>
             <a:endParaRPr lang="en-US" dirty="0"/>
           </a:p>
@@ -9940,7 +9941,7 @@
               <a:pPr>
                 <a:defRPr/>
               </a:pPr>
-              <a:t>10/14/22</a:t>
+              <a:t>11/11/22</a:t>
             </a:fld>
             <a:endParaRPr lang="en-US" dirty="0"/>
           </a:p>
@@ -10278,7 +10279,7 @@
               <a:pPr>
                 <a:defRPr/>
               </a:pPr>
-              <a:t>10/14/22</a:t>
+              <a:t>11/11/22</a:t>
             </a:fld>
             <a:endParaRPr lang="en-US" dirty="0"/>
           </a:p>
@@ -10698,7 +10699,7 @@
               <a:pPr>
                 <a:defRPr/>
               </a:pPr>
-              <a:t>10/14/22</a:t>
+              <a:t>11/11/22</a:t>
             </a:fld>
             <a:endParaRPr lang="en-US" dirty="0"/>
           </a:p>
@@ -10866,7 +10867,7 @@
               <a:pPr>
                 <a:defRPr/>
               </a:pPr>
-              <a:t>10/14/22</a:t>
+              <a:t>11/11/22</a:t>
             </a:fld>
             <a:endParaRPr lang="en-US" dirty="0"/>
           </a:p>
@@ -11006,7 +11007,7 @@
               <a:pPr>
                 <a:defRPr/>
               </a:pPr>
-              <a:t>10/14/22</a:t>
+              <a:t>11/11/22</a:t>
             </a:fld>
             <a:endParaRPr lang="en-US" dirty="0"/>
           </a:p>
@@ -11300,7 +11301,7 @@
               <a:pPr>
                 <a:defRPr/>
               </a:pPr>
-              <a:t>10/14/22</a:t>
+              <a:t>11/11/22</a:t>
             </a:fld>
             <a:endParaRPr lang="en-US" dirty="0"/>
           </a:p>
@@ -11605,7 +11606,7 @@
               <a:pPr>
                 <a:defRPr/>
               </a:pPr>
-              <a:t>10/14/22</a:t>
+              <a:t>11/11/22</a:t>
             </a:fld>
             <a:endParaRPr lang="en-US" dirty="0"/>
           </a:p>
@@ -12600,7 +12601,7 @@
               <a:pPr>
                 <a:defRPr/>
               </a:pPr>
-              <a:t>10/14/22</a:t>
+              <a:t>11/11/22</a:t>
             </a:fld>
             <a:endParaRPr lang="en-US" dirty="0"/>
           </a:p>
@@ -14892,10 +14893,10 @@
       </p:sp>
       <p:pic>
         <p:nvPicPr>
-          <p:cNvPr id="2" name="Picture 1">
+          <p:cNvPr id="3" name="Picture 2">
             <a:extLst>
               <a:ext uri="{FF2B5EF4-FFF2-40B4-BE49-F238E27FC236}">
-                <a16:creationId xmlns:a16="http://schemas.microsoft.com/office/drawing/2014/main" id="{98C0AD86-8444-5FC2-83BF-778D2DDD79D1}"/>
+                <a16:creationId xmlns:a16="http://schemas.microsoft.com/office/drawing/2014/main" id="{184C1C8E-E6DA-3009-E202-3C4C6DB10545}"/>
               </a:ext>
             </a:extLst>
           </p:cNvPr>
@@ -14904,19 +14905,31 @@
           </p:cNvPicPr>
           <p:nvPr/>
         </p:nvPicPr>
-        <p:blipFill rotWithShape="1">
-          <a:blip r:embed="rId3"/>
-          <a:srcRect l="-29600" r="36558"/>
-          <a:stretch/>
+        <p:blipFill>
+          <a:blip r:embed="rId3">
+            <a:extLst>
+              <a:ext uri="{28A0092B-C50C-407E-A947-70E740481C1C}">
+                <a14:useLocalDpi xmlns:a14="http://schemas.microsoft.com/office/drawing/2010/main" val="0"/>
+              </a:ext>
+            </a:extLst>
+          </a:blip>
+          <a:srcRect/>
+          <a:stretch>
+            <a:fillRect/>
+          </a:stretch>
         </p:blipFill>
-        <p:spPr>
+        <p:spPr bwMode="auto">
           <a:xfrm>
-            <a:off x="-1368400" y="1835621"/>
-            <a:ext cx="10009720" cy="5066383"/>
+            <a:off x="-495" y="1619597"/>
+            <a:ext cx="10081120" cy="4036766"/>
           </a:xfrm>
           <a:prstGeom prst="rect">
             <a:avLst/>
           </a:prstGeom>
+          <a:noFill/>
+          <a:ln>
+            <a:noFill/>
+          </a:ln>
         </p:spPr>
       </p:pic>
     </p:spTree>
@@ -14958,6 +14971,77 @@
 <file path=ppt/slides/slide11.xml><?xml version="1.0" encoding="utf-8"?>
 <p:sld xmlns:a="http://schemas.openxmlformats.org/drawingml/2006/main" xmlns:r="http://schemas.openxmlformats.org/officeDocument/2006/relationships" xmlns:p="http://schemas.openxmlformats.org/presentationml/2006/main">
   <p:cSld>
+    <p:spTree>
+      <p:nvGrpSpPr>
+        <p:cNvPr id="1" name=""/>
+        <p:cNvGrpSpPr/>
+        <p:nvPr/>
+      </p:nvGrpSpPr>
+      <p:grpSpPr>
+        <a:xfrm>
+          <a:off x="0" y="0"/>
+          <a:ext cx="0" cy="0"/>
+          <a:chOff x="0" y="0"/>
+          <a:chExt cx="0" cy="0"/>
+        </a:xfrm>
+      </p:grpSpPr>
+      <p:pic>
+        <p:nvPicPr>
+          <p:cNvPr id="4" name="Picture 3">
+            <a:extLst>
+              <a:ext uri="{FF2B5EF4-FFF2-40B4-BE49-F238E27FC236}">
+                <a16:creationId xmlns:a16="http://schemas.microsoft.com/office/drawing/2014/main" id="{674E2D7E-92FF-E55B-2644-021AFDE26B4D}"/>
+              </a:ext>
+            </a:extLst>
+          </p:cNvPr>
+          <p:cNvPicPr>
+            <a:picLocks noChangeAspect="1"/>
+          </p:cNvPicPr>
+          <p:nvPr/>
+        </p:nvPicPr>
+        <p:blipFill>
+          <a:blip r:embed="rId2">
+            <a:extLst>
+              <a:ext uri="{28A0092B-C50C-407E-A947-70E740481C1C}">
+                <a14:useLocalDpi xmlns:a14="http://schemas.microsoft.com/office/drawing/2010/main" val="0"/>
+              </a:ext>
+            </a:extLst>
+          </a:blip>
+          <a:srcRect/>
+          <a:stretch>
+            <a:fillRect/>
+          </a:stretch>
+        </p:blipFill>
+        <p:spPr bwMode="auto">
+          <a:xfrm>
+            <a:off x="298585" y="971525"/>
+            <a:ext cx="9483453" cy="5400600"/>
+          </a:xfrm>
+          <a:prstGeom prst="rect">
+            <a:avLst/>
+          </a:prstGeom>
+          <a:noFill/>
+          <a:ln>
+            <a:noFill/>
+          </a:ln>
+        </p:spPr>
+      </p:pic>
+    </p:spTree>
+    <p:extLst>
+      <p:ext uri="{BB962C8B-B14F-4D97-AF65-F5344CB8AC3E}">
+        <p14:creationId xmlns:p14="http://schemas.microsoft.com/office/powerpoint/2010/main" val="1424130739"/>
+      </p:ext>
+    </p:extLst>
+  </p:cSld>
+  <p:clrMapOvr>
+    <a:masterClrMapping/>
+  </p:clrMapOvr>
+</p:sld>
+</file>
+
+<file path=ppt/slides/slide12.xml><?xml version="1.0" encoding="utf-8"?>
+<p:sld xmlns:a="http://schemas.openxmlformats.org/drawingml/2006/main" xmlns:r="http://schemas.openxmlformats.org/officeDocument/2006/relationships" xmlns:p="http://schemas.openxmlformats.org/presentationml/2006/main">
+  <p:cSld>
     <p:bg>
       <p:bgPr>
         <a:solidFill>
@@ -14980,6 +15064,51 @@
           <a:chExt cx="0" cy="0"/>
         </a:xfrm>
       </p:grpSpPr>
+      <p:pic>
+        <p:nvPicPr>
+          <p:cNvPr id="4" name="Picture 4" descr="What is Node.js? - DevTeam.Space">
+            <a:extLst>
+              <a:ext uri="{FF2B5EF4-FFF2-40B4-BE49-F238E27FC236}">
+                <a16:creationId xmlns:a16="http://schemas.microsoft.com/office/drawing/2014/main" id="{97B02A47-C03B-2189-CF07-3C80F4D59999}"/>
+              </a:ext>
+            </a:extLst>
+          </p:cNvPr>
+          <p:cNvPicPr>
+            <a:picLocks noChangeAspect="1" noChangeArrowheads="1"/>
+          </p:cNvPicPr>
+          <p:nvPr/>
+        </p:nvPicPr>
+        <p:blipFill rotWithShape="1">
+          <a:blip r:embed="rId3">
+            <a:extLst>
+              <a:ext uri="{28A0092B-C50C-407E-A947-70E740481C1C}">
+                <a14:useLocalDpi xmlns:a14="http://schemas.microsoft.com/office/drawing/2010/main" val="0"/>
+              </a:ext>
+            </a:extLst>
+          </a:blip>
+          <a:srcRect t="24822" b="23946"/>
+          <a:stretch/>
+        </p:blipFill>
+        <p:spPr bwMode="auto">
+          <a:xfrm>
+            <a:off x="3888184" y="2278263"/>
+            <a:ext cx="4100295" cy="1576810"/>
+          </a:xfrm>
+          <a:prstGeom prst="rect">
+            <a:avLst/>
+          </a:prstGeom>
+          <a:noFill/>
+          <a:extLst>
+            <a:ext uri="{909E8E84-426E-40DD-AFC4-6F175D3DCCD1}">
+              <a14:hiddenFill xmlns:a14="http://schemas.microsoft.com/office/drawing/2010/main">
+                <a:solidFill>
+                  <a:srgbClr val="FFFFFF"/>
+                </a:solidFill>
+              </a14:hiddenFill>
+            </a:ext>
+          </a:extLst>
+        </p:spPr>
+      </p:pic>
       <p:sp>
         <p:nvSpPr>
           <p:cNvPr id="8194" name="Rectangle 1">
@@ -15918,6 +16047,29 @@
               <a:t>S3 Bucket</a:t>
             </a:r>
           </a:p>
+          <a:p>
+            <a:pPr marL="566737" indent="-457200" eaLnBrk="1" fontAlgn="auto" hangingPunct="1">
+              <a:lnSpc>
+                <a:spcPct val="150000"/>
+              </a:lnSpc>
+              <a:spcBef>
+                <a:spcPts val="0"/>
+              </a:spcBef>
+              <a:spcAft>
+                <a:spcPts val="1413"/>
+              </a:spcAft>
+              <a:buFontTx/>
+              <a:buAutoNum type="arabicPeriod"/>
+              <a:defRPr/>
+            </a:pPr>
+            <a:r>
+              <a:rPr lang="en-IN" altLang="en-US" sz="2400" dirty="0">
+                <a:latin typeface="Times New Roman" panose="02020603050405020304" pitchFamily="18" charset="0"/>
+                <a:cs typeface="Times New Roman" panose="02020603050405020304" pitchFamily="18" charset="0"/>
+              </a:rPr>
+              <a:t>Docker</a:t>
+            </a:r>
+          </a:p>
         </p:txBody>
       </p:sp>
       <p:pic>
@@ -15935,14 +16087,14 @@
           <p:nvPr/>
         </p:nvPicPr>
         <p:blipFill>
-          <a:blip r:embed="rId3"/>
+          <a:blip r:embed="rId4"/>
           <a:stretch>
             <a:fillRect/>
           </a:stretch>
         </p:blipFill>
         <p:spPr>
           <a:xfrm>
-            <a:off x="5194299" y="969963"/>
+            <a:off x="4468306" y="1088793"/>
             <a:ext cx="2762250" cy="1407641"/>
           </a:xfrm>
           <a:prstGeom prst="rect">
@@ -15964,23 +16116,21 @@
           </p:cNvPicPr>
           <p:nvPr/>
         </p:nvPicPr>
-        <p:blipFill>
-          <a:blip r:embed="rId4">
+        <p:blipFill rotWithShape="1">
+          <a:blip r:embed="rId5">
             <a:extLst>
               <a:ext uri="{28A0092B-C50C-407E-A947-70E740481C1C}">
                 <a14:useLocalDpi xmlns:a14="http://schemas.microsoft.com/office/drawing/2010/main" val="0"/>
               </a:ext>
             </a:extLst>
           </a:blip>
-          <a:srcRect/>
-          <a:stretch>
-            <a:fillRect/>
-          </a:stretch>
+          <a:srcRect l="-90" t="23604" r="90" b="27708"/>
+          <a:stretch/>
         </p:blipFill>
         <p:spPr bwMode="auto">
           <a:xfrm>
-            <a:off x="5472360" y="2207804"/>
-            <a:ext cx="2793793" cy="1676276"/>
+            <a:off x="6048424" y="4095214"/>
+            <a:ext cx="2220069" cy="648537"/>
           </a:xfrm>
           <a:prstGeom prst="rect">
             <a:avLst/>
@@ -16003,53 +16153,6 @@
             <a:extLst>
               <a:ext uri="{FF2B5EF4-FFF2-40B4-BE49-F238E27FC236}">
                 <a16:creationId xmlns:a16="http://schemas.microsoft.com/office/drawing/2014/main" id="{79A6F496-A331-2852-EBFF-A56D5EC97769}"/>
-              </a:ext>
-            </a:extLst>
-          </p:cNvPr>
-          <p:cNvPicPr>
-            <a:picLocks noChangeAspect="1" noChangeArrowheads="1"/>
-          </p:cNvPicPr>
-          <p:nvPr/>
-        </p:nvPicPr>
-        <p:blipFill>
-          <a:blip r:embed="rId5">
-            <a:extLst>
-              <a:ext uri="{28A0092B-C50C-407E-A947-70E740481C1C}">
-                <a14:useLocalDpi xmlns:a14="http://schemas.microsoft.com/office/drawing/2010/main" val="0"/>
-              </a:ext>
-            </a:extLst>
-          </a:blip>
-          <a:srcRect/>
-          <a:stretch>
-            <a:fillRect/>
-          </a:stretch>
-        </p:blipFill>
-        <p:spPr bwMode="auto">
-          <a:xfrm>
-            <a:off x="985715" y="5532183"/>
-            <a:ext cx="4042418" cy="1082957"/>
-          </a:xfrm>
-          <a:prstGeom prst="rect">
-            <a:avLst/>
-          </a:prstGeom>
-          <a:noFill/>
-          <a:extLst>
-            <a:ext uri="{909E8E84-426E-40DD-AFC4-6F175D3DCCD1}">
-              <a14:hiddenFill xmlns:a14="http://schemas.microsoft.com/office/drawing/2010/main">
-                <a:solidFill>
-                  <a:srgbClr val="FFFFFF"/>
-                </a:solidFill>
-              </a14:hiddenFill>
-            </a:ext>
-          </a:extLst>
-        </p:spPr>
-      </p:pic>
-      <p:pic>
-        <p:nvPicPr>
-          <p:cNvPr id="1028" name="Picture 4" descr="Node.js - Wikipedia">
-            <a:extLst>
-              <a:ext uri="{FF2B5EF4-FFF2-40B4-BE49-F238E27FC236}">
-                <a16:creationId xmlns:a16="http://schemas.microsoft.com/office/drawing/2014/main" id="{A45E94FE-1E9E-B8AD-CAF1-1A33DA5BF817}"/>
               </a:ext>
             </a:extLst>
           </p:cNvPr>
@@ -16073,8 +16176,8 @@
         </p:blipFill>
         <p:spPr bwMode="auto">
           <a:xfrm>
-            <a:off x="6085932" y="4697996"/>
-            <a:ext cx="1965124" cy="1498749"/>
+            <a:off x="5472360" y="5040605"/>
+            <a:ext cx="2220069" cy="594753"/>
           </a:xfrm>
           <a:prstGeom prst="rect">
             <a:avLst/>
@@ -16120,8 +16223,55 @@
         </p:blipFill>
         <p:spPr bwMode="auto">
           <a:xfrm>
-            <a:off x="3433364" y="3372878"/>
+            <a:off x="4267173" y="5932213"/>
             <a:ext cx="1832028" cy="1262064"/>
+          </a:xfrm>
+          <a:prstGeom prst="rect">
+            <a:avLst/>
+          </a:prstGeom>
+          <a:noFill/>
+          <a:extLst>
+            <a:ext uri="{909E8E84-426E-40DD-AFC4-6F175D3DCCD1}">
+              <a14:hiddenFill xmlns:a14="http://schemas.microsoft.com/office/drawing/2010/main">
+                <a:solidFill>
+                  <a:srgbClr val="FFFFFF"/>
+                </a:solidFill>
+              </a14:hiddenFill>
+            </a:ext>
+          </a:extLst>
+        </p:spPr>
+      </p:pic>
+      <p:pic>
+        <p:nvPicPr>
+          <p:cNvPr id="1026" name="Picture 2" descr="A practical introduction to Docker containers | Red Hat Developer">
+            <a:extLst>
+              <a:ext uri="{FF2B5EF4-FFF2-40B4-BE49-F238E27FC236}">
+                <a16:creationId xmlns:a16="http://schemas.microsoft.com/office/drawing/2014/main" id="{084425EF-6A7C-16AF-C997-E817FDDD614B}"/>
+              </a:ext>
+            </a:extLst>
+          </p:cNvPr>
+          <p:cNvPicPr>
+            <a:picLocks noChangeAspect="1" noChangeArrowheads="1"/>
+          </p:cNvPicPr>
+          <p:nvPr/>
+        </p:nvPicPr>
+        <p:blipFill>
+          <a:blip r:embed="rId8">
+            <a:extLst>
+              <a:ext uri="{28A0092B-C50C-407E-A947-70E740481C1C}">
+                <a14:useLocalDpi xmlns:a14="http://schemas.microsoft.com/office/drawing/2010/main" val="0"/>
+              </a:ext>
+            </a:extLst>
+          </a:blip>
+          <a:srcRect/>
+          <a:stretch>
+            <a:fillRect/>
+          </a:stretch>
+        </p:blipFill>
+        <p:spPr bwMode="auto">
+          <a:xfrm>
+            <a:off x="2232000" y="5796061"/>
+            <a:ext cx="1394079" cy="1151385"/>
           </a:xfrm>
           <a:prstGeom prst="rect">
             <a:avLst/>
@@ -16174,7 +16324,7 @@
 </p:sld>
 </file>
 
-<file path=ppt/slides/slide12.xml><?xml version="1.0" encoding="utf-8"?>
+<file path=ppt/slides/slide13.xml><?xml version="1.0" encoding="utf-8"?>
 <p:sld xmlns:a="http://schemas.openxmlformats.org/drawingml/2006/main" xmlns:r="http://schemas.openxmlformats.org/officeDocument/2006/relationships" xmlns:p="http://schemas.openxmlformats.org/presentationml/2006/main">
   <p:cSld>
     <p:spTree>
@@ -16264,6 +16414,17 @@
           <a:bodyPr/>
           <a:lstStyle/>
           <a:p>
+            <a:pPr algn="just">
+              <a:lnSpc>
+                <a:spcPct val="150000"/>
+              </a:lnSpc>
+              <a:buClr>
+                <a:schemeClr val="tx1"/>
+              </a:buClr>
+              <a:buSzPct val="100000"/>
+              <a:buFont typeface="Arial" panose="020B0604020202020204" pitchFamily="34" charset="0"/>
+              <a:buChar char="•"/>
+            </a:pPr>
             <a:r>
               <a:rPr lang="en-IN" altLang="en-US" dirty="0">
                 <a:latin typeface="Times New Roman" panose="02020603050405020304" pitchFamily="18" charset="0"/>
@@ -16273,6 +16434,17 @@
             </a:r>
           </a:p>
           <a:p>
+            <a:pPr algn="just">
+              <a:lnSpc>
+                <a:spcPct val="150000"/>
+              </a:lnSpc>
+              <a:buClr>
+                <a:schemeClr val="tx1"/>
+              </a:buClr>
+              <a:buSzPct val="100000"/>
+              <a:buFont typeface="Arial" panose="020B0604020202020204" pitchFamily="34" charset="0"/>
+              <a:buChar char="•"/>
+            </a:pPr>
             <a:r>
               <a:rPr lang="en-IN" altLang="en-US" dirty="0">
                 <a:latin typeface="Times New Roman" panose="02020603050405020304" pitchFamily="18" charset="0"/>
@@ -16282,6 +16454,11 @@
             </a:r>
           </a:p>
           <a:p>
+            <a:pPr algn="just">
+              <a:lnSpc>
+                <a:spcPct val="150000"/>
+              </a:lnSpc>
+            </a:pPr>
             <a:endParaRPr lang="en-IN" altLang="en-US" dirty="0">
               <a:latin typeface="Times New Roman" panose="02020603050405020304" pitchFamily="18" charset="0"/>
               <a:cs typeface="Times New Roman" panose="02020603050405020304" pitchFamily="18" charset="0"/>
@@ -16297,7 +16474,7 @@
 </p:sld>
 </file>
 
-<file path=ppt/slides/slide13.xml><?xml version="1.0" encoding="utf-8"?>
+<file path=ppt/slides/slide14.xml><?xml version="1.0" encoding="utf-8"?>
 <p:sld xmlns:a="http://schemas.openxmlformats.org/drawingml/2006/main" xmlns:r="http://schemas.openxmlformats.org/officeDocument/2006/relationships" xmlns:p="http://schemas.openxmlformats.org/presentationml/2006/main">
   <p:cSld>
     <p:spTree>
@@ -16453,7 +16630,7 @@
 </p:sld>
 </file>
 
-<file path=ppt/slides/slide14.xml><?xml version="1.0" encoding="utf-8"?>
+<file path=ppt/slides/slide15.xml><?xml version="1.0" encoding="utf-8"?>
 <p:sld xmlns:a="http://schemas.openxmlformats.org/drawingml/2006/main" xmlns:r="http://schemas.openxmlformats.org/officeDocument/2006/relationships" xmlns:p="http://schemas.openxmlformats.org/presentationml/2006/main">
   <p:cSld>
     <p:spTree>
@@ -16632,7 +16809,7 @@
 </p:sld>
 </file>
 
-<file path=ppt/slides/slide15.xml><?xml version="1.0" encoding="utf-8"?>
+<file path=ppt/slides/slide16.xml><?xml version="1.0" encoding="utf-8"?>
 <p:sld xmlns:a="http://schemas.openxmlformats.org/drawingml/2006/main" xmlns:r="http://schemas.openxmlformats.org/officeDocument/2006/relationships" xmlns:p="http://schemas.openxmlformats.org/presentationml/2006/main">
   <p:cSld>
     <p:spTree>
@@ -16715,15 +16892,30 @@
         <p:spPr>
           <a:xfrm>
             <a:off x="791840" y="1640680"/>
-            <a:ext cx="6997700" cy="4278313"/>
+            <a:ext cx="7848872" cy="4278313"/>
           </a:xfrm>
+          <a:noFill/>
+          <a:ln>
+            <a:noFill/>
+          </a:ln>
         </p:spPr>
         <p:txBody>
           <a:bodyPr/>
           <a:lstStyle/>
           <a:p>
+            <a:pPr algn="just">
+              <a:lnSpc>
+                <a:spcPct val="150000"/>
+              </a:lnSpc>
+              <a:buClr>
+                <a:schemeClr val="tx1"/>
+              </a:buClr>
+              <a:buSzPct val="100000"/>
+              <a:buFont typeface="Arial" panose="020B0604020202020204" pitchFamily="34" charset="0"/>
+              <a:buChar char="•"/>
+            </a:pPr>
             <a:r>
-              <a:rPr lang="en-IN" sz="2000" dirty="0">
+              <a:rPr lang="en-IN" dirty="0">
                 <a:latin typeface="Times New Roman" panose="02020603050405020304" pitchFamily="18" charset="0"/>
                 <a:cs typeface="Times New Roman" panose="02020603050405020304" pitchFamily="18" charset="0"/>
               </a:rPr>
@@ -16731,8 +16923,19 @@
             </a:r>
           </a:p>
           <a:p>
+            <a:pPr algn="just">
+              <a:lnSpc>
+                <a:spcPct val="150000"/>
+              </a:lnSpc>
+              <a:buClr>
+                <a:schemeClr val="tx1"/>
+              </a:buClr>
+              <a:buSzPct val="100000"/>
+              <a:buFont typeface="Arial" panose="020B0604020202020204" pitchFamily="34" charset="0"/>
+              <a:buChar char="•"/>
+            </a:pPr>
             <a:r>
-              <a:rPr lang="en-IN" sz="2000" dirty="0">
+              <a:rPr lang="en-IN" dirty="0">
                 <a:latin typeface="Times New Roman" panose="02020603050405020304" pitchFamily="18" charset="0"/>
                 <a:cs typeface="Times New Roman" panose="02020603050405020304" pitchFamily="18" charset="0"/>
               </a:rPr>
@@ -16740,8 +16943,19 @@
             </a:r>
           </a:p>
           <a:p>
+            <a:pPr algn="just">
+              <a:lnSpc>
+                <a:spcPct val="150000"/>
+              </a:lnSpc>
+              <a:buClr>
+                <a:schemeClr val="tx1"/>
+              </a:buClr>
+              <a:buSzPct val="100000"/>
+              <a:buFont typeface="Arial" panose="020B0604020202020204" pitchFamily="34" charset="0"/>
+              <a:buChar char="•"/>
+            </a:pPr>
             <a:r>
-              <a:rPr lang="en-IN" sz="2000" dirty="0">
+              <a:rPr lang="en-IN" dirty="0">
                 <a:latin typeface="Times New Roman" panose="02020603050405020304" pitchFamily="18" charset="0"/>
                 <a:cs typeface="Times New Roman" panose="02020603050405020304" pitchFamily="18" charset="0"/>
               </a:rPr>
@@ -16749,14 +16963,28 @@
             </a:r>
           </a:p>
           <a:p>
+            <a:pPr algn="just">
+              <a:lnSpc>
+                <a:spcPct val="150000"/>
+              </a:lnSpc>
+              <a:buClr>
+                <a:schemeClr val="tx1"/>
+              </a:buClr>
+              <a:buSzPct val="100000"/>
+              <a:buFont typeface="Arial" panose="020B0604020202020204" pitchFamily="34" charset="0"/>
+              <a:buChar char="•"/>
+            </a:pPr>
             <a:r>
-              <a:rPr lang="en-IN" sz="2000" dirty="0">
+              <a:rPr lang="en-IN" dirty="0">
                 <a:latin typeface="Times New Roman" panose="02020603050405020304" pitchFamily="18" charset="0"/>
                 <a:cs typeface="Times New Roman" panose="02020603050405020304" pitchFamily="18" charset="0"/>
               </a:rPr>
               <a:t>The Future Scope of this project is to add a receptionist to handle the payment for the approved reimbursement request. </a:t>
             </a:r>
-            <a:endParaRPr lang="en-IN" altLang="en-US" dirty="0"/>
+            <a:endParaRPr lang="en-IN" altLang="en-US" dirty="0">
+              <a:latin typeface="Times New Roman" panose="02020603050405020304" pitchFamily="18" charset="0"/>
+              <a:cs typeface="Times New Roman" panose="02020603050405020304" pitchFamily="18" charset="0"/>
+            </a:endParaRPr>
           </a:p>
         </p:txBody>
       </p:sp>
@@ -16768,7 +16996,7 @@
 </p:sld>
 </file>
 
-<file path=ppt/slides/slide16.xml><?xml version="1.0" encoding="utf-8"?>
+<file path=ppt/slides/slide17.xml><?xml version="1.0" encoding="utf-8"?>
 <p:sld xmlns:a="http://schemas.openxmlformats.org/drawingml/2006/main" xmlns:r="http://schemas.openxmlformats.org/officeDocument/2006/relationships" xmlns:p="http://schemas.openxmlformats.org/presentationml/2006/main">
   <p:cSld>
     <p:bg>
@@ -16809,7 +17037,7 @@
         </p:nvSpPr>
         <p:spPr bwMode="auto">
           <a:xfrm>
-            <a:off x="647701" y="2411686"/>
+            <a:off x="719770" y="3023753"/>
             <a:ext cx="8641084" cy="1512168"/>
           </a:xfrm>
           <a:prstGeom prst="rect">
@@ -17620,8 +17848,8 @@
         </p:nvSpPr>
         <p:spPr bwMode="auto">
           <a:xfrm>
-            <a:off x="377825" y="466725"/>
-            <a:ext cx="9323388" cy="5578475"/>
+            <a:off x="492690" y="611485"/>
+            <a:ext cx="9323388" cy="6841337"/>
           </a:xfrm>
           <a:prstGeom prst="rect">
             <a:avLst/>
@@ -17971,7 +18199,7 @@
               <a:buChar char=""/>
             </a:pPr>
             <a:r>
-              <a:rPr lang="en-IN" altLang="en-US" sz="2400" b="1" dirty="0">
+              <a:rPr lang="en-IN" altLang="en-US" sz="2400" dirty="0">
                 <a:solidFill>
                   <a:srgbClr val="000000"/>
                 </a:solidFill>
@@ -17994,7 +18222,7 @@
               <a:buChar char=""/>
             </a:pPr>
             <a:r>
-              <a:rPr lang="en-IN" altLang="en-US" sz="2400" b="1" dirty="0">
+              <a:rPr lang="en-IN" altLang="en-US" sz="2400" dirty="0">
                 <a:solidFill>
                   <a:srgbClr val="000000"/>
                 </a:solidFill>
@@ -18017,7 +18245,7 @@
               <a:buChar char=""/>
             </a:pPr>
             <a:r>
-              <a:rPr lang="en-IN" altLang="en-US" sz="2400" b="1" dirty="0">
+              <a:rPr lang="en-IN" altLang="en-US" sz="2400" dirty="0">
                 <a:solidFill>
                   <a:srgbClr val="000000"/>
                 </a:solidFill>
@@ -18040,7 +18268,7 @@
               <a:buChar char=""/>
             </a:pPr>
             <a:r>
-              <a:rPr lang="en-IN" altLang="en-US" sz="2400" b="1" dirty="0">
+              <a:rPr lang="en-IN" altLang="en-US" sz="2400" dirty="0">
                 <a:solidFill>
                   <a:srgbClr val="000000"/>
                 </a:solidFill>
@@ -18063,7 +18291,7 @@
               <a:buChar char=""/>
             </a:pPr>
             <a:r>
-              <a:rPr lang="en-IN" altLang="en-US" sz="2400" b="1" dirty="0">
+              <a:rPr lang="en-IN" altLang="en-US" sz="2400" dirty="0">
                 <a:solidFill>
                   <a:srgbClr val="000000"/>
                 </a:solidFill>
@@ -18086,7 +18314,7 @@
               <a:buChar char=""/>
             </a:pPr>
             <a:r>
-              <a:rPr lang="en-IN" altLang="en-US" sz="2400" b="1" dirty="0">
+              <a:rPr lang="en-IN" altLang="en-US" sz="2400" dirty="0">
                 <a:solidFill>
                   <a:srgbClr val="000000"/>
                 </a:solidFill>
@@ -18109,7 +18337,7 @@
               <a:buChar char=""/>
             </a:pPr>
             <a:r>
-              <a:rPr lang="en-IN" altLang="en-US" sz="2400" b="1" dirty="0">
+              <a:rPr lang="en-IN" altLang="en-US" sz="2400" dirty="0">
                 <a:solidFill>
                   <a:srgbClr val="000000"/>
                 </a:solidFill>
@@ -18132,7 +18360,7 @@
               <a:buChar char=""/>
             </a:pPr>
             <a:r>
-              <a:rPr lang="en-IN" altLang="en-US" sz="2400" b="1" dirty="0">
+              <a:rPr lang="en-IN" altLang="en-US" sz="2400" dirty="0">
                 <a:solidFill>
                   <a:srgbClr val="000000"/>
                 </a:solidFill>
@@ -18155,7 +18383,7 @@
               <a:buChar char=""/>
             </a:pPr>
             <a:r>
-              <a:rPr lang="en-IN" altLang="en-US" sz="2400" b="1" dirty="0">
+              <a:rPr lang="en-IN" altLang="en-US" sz="2400" dirty="0">
                 <a:solidFill>
                   <a:srgbClr val="000000"/>
                 </a:solidFill>
@@ -18178,7 +18406,7 @@
               <a:buChar char=""/>
             </a:pPr>
             <a:r>
-              <a:rPr lang="en-IN" altLang="en-US" sz="2400" b="1" dirty="0">
+              <a:rPr lang="en-IN" altLang="en-US" sz="2400" dirty="0">
                 <a:solidFill>
                   <a:srgbClr val="000000"/>
                 </a:solidFill>
@@ -18201,7 +18429,7 @@
               <a:buChar char=""/>
             </a:pPr>
             <a:r>
-              <a:rPr lang="en-IN" altLang="en-US" sz="2400" b="1" dirty="0">
+              <a:rPr lang="en-IN" altLang="en-US" sz="2400" dirty="0">
                 <a:solidFill>
                   <a:srgbClr val="000000"/>
                 </a:solidFill>
@@ -18224,7 +18452,7 @@
               <a:buChar char=""/>
             </a:pPr>
             <a:r>
-              <a:rPr lang="en-IN" altLang="en-US" sz="2400" b="1" dirty="0">
+              <a:rPr lang="en-IN" altLang="en-US" sz="2400" dirty="0">
                 <a:solidFill>
                   <a:srgbClr val="000000"/>
                 </a:solidFill>
@@ -18247,7 +18475,7 @@
               <a:buChar char=""/>
             </a:pPr>
             <a:r>
-              <a:rPr lang="en-IN" altLang="en-US" sz="2400" b="1" dirty="0">
+              <a:rPr lang="en-IN" altLang="en-US" sz="2400" dirty="0">
                 <a:solidFill>
                   <a:srgbClr val="000000"/>
                 </a:solidFill>
@@ -18256,52 +18484,6 @@
               </a:rPr>
               <a:t>References</a:t>
             </a:r>
-          </a:p>
-          <a:p>
-            <a:pPr eaLnBrk="1" hangingPunct="1">
-              <a:lnSpc>
-                <a:spcPct val="150000"/>
-              </a:lnSpc>
-              <a:spcAft>
-                <a:spcPts val="1413"/>
-              </a:spcAft>
-              <a:buClr>
-                <a:srgbClr val="000000"/>
-              </a:buClr>
-              <a:buSzPct val="45000"/>
-              <a:buFont typeface="Wingdings" panose="05000000000000000000" pitchFamily="2" charset="2"/>
-              <a:buChar char=""/>
-            </a:pPr>
-            <a:endParaRPr lang="en-IN" altLang="en-US" sz="2400" dirty="0">
-              <a:solidFill>
-                <a:srgbClr val="000000"/>
-              </a:solidFill>
-              <a:latin typeface="Times New Roman" panose="02020603050405020304" pitchFamily="18" charset="0"/>
-              <a:cs typeface="DejaVu Sans" charset="0"/>
-            </a:endParaRPr>
-          </a:p>
-          <a:p>
-            <a:pPr eaLnBrk="1" hangingPunct="1">
-              <a:lnSpc>
-                <a:spcPct val="200000"/>
-              </a:lnSpc>
-              <a:spcAft>
-                <a:spcPts val="1413"/>
-              </a:spcAft>
-              <a:buClr>
-                <a:srgbClr val="000000"/>
-              </a:buClr>
-              <a:buSzPct val="45000"/>
-              <a:buFont typeface="Wingdings" panose="05000000000000000000" pitchFamily="2" charset="2"/>
-              <a:buChar char=""/>
-            </a:pPr>
-            <a:endParaRPr lang="en-IN" altLang="en-US" sz="2400" dirty="0">
-              <a:solidFill>
-                <a:srgbClr val="000000"/>
-              </a:solidFill>
-              <a:latin typeface="Times New Roman" panose="02020603050405020304" pitchFamily="18" charset="0"/>
-              <a:cs typeface="DejaVu Sans" charset="0"/>
-            </a:endParaRPr>
           </a:p>
         </p:txBody>
       </p:sp>
@@ -18819,7 +19001,7 @@
         </p:nvSpPr>
         <p:spPr bwMode="auto">
           <a:xfrm>
-            <a:off x="503238" y="1768475"/>
+            <a:off x="359792" y="1285080"/>
             <a:ext cx="9070975" cy="4989513"/>
           </a:xfrm>
           <a:prstGeom prst="rect">
@@ -19911,8 +20093,8 @@
         </p:nvSpPr>
         <p:spPr bwMode="auto">
           <a:xfrm>
-            <a:off x="503238" y="1768475"/>
-            <a:ext cx="9070975" cy="4989513"/>
+            <a:off x="359792" y="2311722"/>
+            <a:ext cx="9070975" cy="2936229"/>
           </a:xfrm>
           <a:prstGeom prst="rect">
             <a:avLst/>
@@ -20263,25 +20445,7 @@
             </a:lvl9pPr>
           </a:lstStyle>
           <a:p>
-            <a:pPr marL="109537" indent="0" eaLnBrk="1" fontAlgn="auto" hangingPunct="1">
-              <a:lnSpc>
-                <a:spcPct val="93000"/>
-              </a:lnSpc>
-              <a:spcBef>
-                <a:spcPts val="0"/>
-              </a:spcBef>
-              <a:spcAft>
-                <a:spcPts val="1413"/>
-              </a:spcAft>
-              <a:defRPr/>
-            </a:pPr>
-            <a:endParaRPr lang="en-IN" altLang="en-US" sz="2400" dirty="0">
-              <a:latin typeface="Times New Roman" panose="02020603050405020304" pitchFamily="18" charset="0"/>
-              <a:cs typeface="Times New Roman" panose="02020603050405020304" pitchFamily="18" charset="0"/>
-            </a:endParaRPr>
-          </a:p>
-          <a:p>
-            <a:pPr marL="566737" indent="-457200" eaLnBrk="1" fontAlgn="auto" hangingPunct="1">
+            <a:pPr marL="566737" indent="-457200" algn="just" eaLnBrk="1" fontAlgn="auto" hangingPunct="1">
               <a:lnSpc>
                 <a:spcPct val="93000"/>
               </a:lnSpc>
@@ -20304,7 +20468,7 @@
             </a:r>
           </a:p>
           <a:p>
-            <a:pPr marL="566737" indent="-457200" eaLnBrk="1" fontAlgn="auto" hangingPunct="1">
+            <a:pPr marL="566737" indent="-457200" algn="just" eaLnBrk="1" fontAlgn="auto" hangingPunct="1">
               <a:lnSpc>
                 <a:spcPct val="93000"/>
               </a:lnSpc>
@@ -20330,7 +20494,7 @@
             </a:r>
           </a:p>
           <a:p>
-            <a:pPr marL="566737" indent="-457200" eaLnBrk="1" fontAlgn="auto" hangingPunct="1">
+            <a:pPr marL="566737" indent="-457200" algn="just" eaLnBrk="1" fontAlgn="auto" hangingPunct="1">
               <a:lnSpc>
                 <a:spcPct val="93000"/>
               </a:lnSpc>
@@ -20356,7 +20520,7 @@
             </a:r>
           </a:p>
           <a:p>
-            <a:pPr marL="566737" indent="-457200" eaLnBrk="1" fontAlgn="auto" hangingPunct="1">
+            <a:pPr marL="566737" indent="-457200" algn="just" eaLnBrk="1" fontAlgn="auto" hangingPunct="1">
               <a:lnSpc>
                 <a:spcPct val="93000"/>
               </a:lnSpc>
@@ -20382,7 +20546,7 @@
             </a:r>
           </a:p>
           <a:p>
-            <a:pPr marL="566737" indent="-457200" eaLnBrk="1" fontAlgn="auto" hangingPunct="1">
+            <a:pPr marL="566737" indent="-457200" algn="just" eaLnBrk="1" fontAlgn="auto" hangingPunct="1">
               <a:lnSpc>
                 <a:spcPct val="93000"/>
               </a:lnSpc>
@@ -20408,7 +20572,7 @@
             </a:r>
           </a:p>
           <a:p>
-            <a:pPr marL="109537" indent="0" eaLnBrk="1" fontAlgn="auto" hangingPunct="1">
+            <a:pPr marL="109537" indent="0" algn="just" eaLnBrk="1" fontAlgn="auto" hangingPunct="1">
               <a:lnSpc>
                 <a:spcPct val="93000"/>
               </a:lnSpc>
@@ -20418,112 +20582,6 @@
               <a:spcAft>
                 <a:spcPts val="1413"/>
               </a:spcAft>
-              <a:defRPr/>
-            </a:pPr>
-            <a:endParaRPr lang="en-US" sz="2400" dirty="0">
-              <a:solidFill>
-                <a:srgbClr val="0F151B"/>
-              </a:solidFill>
-              <a:latin typeface="Times New Roman" panose="02020603050405020304" pitchFamily="18" charset="0"/>
-              <a:cs typeface="Times New Roman" panose="02020603050405020304" pitchFamily="18" charset="0"/>
-            </a:endParaRPr>
-          </a:p>
-          <a:p>
-            <a:pPr marL="566737" indent="-457200" eaLnBrk="1" fontAlgn="auto" hangingPunct="1">
-              <a:lnSpc>
-                <a:spcPct val="93000"/>
-              </a:lnSpc>
-              <a:spcBef>
-                <a:spcPts val="0"/>
-              </a:spcBef>
-              <a:spcAft>
-                <a:spcPts val="1413"/>
-              </a:spcAft>
-              <a:buFont typeface="+mj-lt"/>
-              <a:buAutoNum type="arabicPeriod"/>
-              <a:defRPr/>
-            </a:pPr>
-            <a:endParaRPr lang="en-US" sz="2400" dirty="0">
-              <a:solidFill>
-                <a:srgbClr val="0F151B"/>
-              </a:solidFill>
-              <a:latin typeface="Times New Roman" panose="02020603050405020304" pitchFamily="18" charset="0"/>
-              <a:cs typeface="Times New Roman" panose="02020603050405020304" pitchFamily="18" charset="0"/>
-            </a:endParaRPr>
-          </a:p>
-          <a:p>
-            <a:pPr marL="566737" indent="-457200" eaLnBrk="1" fontAlgn="auto" hangingPunct="1">
-              <a:lnSpc>
-                <a:spcPct val="93000"/>
-              </a:lnSpc>
-              <a:spcBef>
-                <a:spcPts val="0"/>
-              </a:spcBef>
-              <a:spcAft>
-                <a:spcPts val="1413"/>
-              </a:spcAft>
-              <a:buFont typeface="+mj-lt"/>
-              <a:buAutoNum type="arabicPeriod"/>
-              <a:defRPr/>
-            </a:pPr>
-            <a:endParaRPr lang="en-US" sz="2400" dirty="0">
-              <a:solidFill>
-                <a:srgbClr val="0F151B"/>
-              </a:solidFill>
-              <a:latin typeface="Source Serif Pro" panose="020B0604020202020204" pitchFamily="18" charset="0"/>
-            </a:endParaRPr>
-          </a:p>
-          <a:p>
-            <a:pPr marL="566737" indent="-457200" eaLnBrk="1" fontAlgn="auto" hangingPunct="1">
-              <a:lnSpc>
-                <a:spcPct val="93000"/>
-              </a:lnSpc>
-              <a:spcBef>
-                <a:spcPts val="0"/>
-              </a:spcBef>
-              <a:spcAft>
-                <a:spcPts val="1413"/>
-              </a:spcAft>
-              <a:buFont typeface="+mj-lt"/>
-              <a:buAutoNum type="arabicPeriod"/>
-              <a:defRPr/>
-            </a:pPr>
-            <a:endParaRPr lang="en-IN" altLang="en-US" sz="2400" dirty="0">
-              <a:latin typeface="Times New Roman" panose="02020603050405020304" pitchFamily="18" charset="0"/>
-              <a:cs typeface="Times New Roman" panose="02020603050405020304" pitchFamily="18" charset="0"/>
-            </a:endParaRPr>
-          </a:p>
-          <a:p>
-            <a:pPr marL="109537" indent="0" eaLnBrk="1" fontAlgn="auto" hangingPunct="1">
-              <a:lnSpc>
-                <a:spcPct val="93000"/>
-              </a:lnSpc>
-              <a:spcBef>
-                <a:spcPts val="0"/>
-              </a:spcBef>
-              <a:spcAft>
-                <a:spcPts val="1413"/>
-              </a:spcAft>
-              <a:defRPr/>
-            </a:pPr>
-            <a:endParaRPr lang="en-IN" altLang="en-US" sz="2400" dirty="0">
-              <a:latin typeface="Times New Roman" panose="02020603050405020304" pitchFamily="18" charset="0"/>
-              <a:cs typeface="Times New Roman" panose="02020603050405020304" pitchFamily="18" charset="0"/>
-            </a:endParaRPr>
-          </a:p>
-          <a:p>
-            <a:pPr marL="566737" indent="-457200" eaLnBrk="1" fontAlgn="auto" hangingPunct="1">
-              <a:lnSpc>
-                <a:spcPct val="93000"/>
-              </a:lnSpc>
-              <a:spcBef>
-                <a:spcPts val="0"/>
-              </a:spcBef>
-              <a:spcAft>
-                <a:spcPts val="1413"/>
-              </a:spcAft>
-              <a:buFont typeface="+mj-lt"/>
-              <a:buAutoNum type="arabicPeriod"/>
               <a:defRPr/>
             </a:pPr>
             <a:endParaRPr lang="en-IN" altLang="en-US" sz="2400" dirty="0">
@@ -21047,8 +21105,8 @@
         </p:nvSpPr>
         <p:spPr bwMode="auto">
           <a:xfrm>
-            <a:off x="503238" y="1768475"/>
-            <a:ext cx="9070975" cy="4989513"/>
+            <a:off x="503238" y="1768476"/>
+            <a:ext cx="9070975" cy="3667546"/>
           </a:xfrm>
           <a:prstGeom prst="rect">
             <a:avLst/>
@@ -21417,7 +21475,7 @@
             </a:endParaRPr>
           </a:p>
           <a:p>
-            <a:pPr marL="566737" indent="-457200" eaLnBrk="1" fontAlgn="auto" hangingPunct="1">
+            <a:pPr marL="566737" indent="-457200" algn="just" eaLnBrk="1" fontAlgn="auto" hangingPunct="1">
               <a:lnSpc>
                 <a:spcPct val="93000"/>
               </a:lnSpc>
@@ -21440,7 +21498,7 @@
             </a:r>
           </a:p>
           <a:p>
-            <a:pPr marL="566737" indent="-457200" eaLnBrk="1" fontAlgn="auto" hangingPunct="1">
+            <a:pPr marL="566737" indent="-457200" algn="just" eaLnBrk="1" fontAlgn="auto" hangingPunct="1">
               <a:lnSpc>
                 <a:spcPct val="93000"/>
               </a:lnSpc>
@@ -21463,7 +21521,7 @@
             </a:r>
           </a:p>
           <a:p>
-            <a:pPr marL="566737" indent="-457200" eaLnBrk="1" fontAlgn="auto" hangingPunct="1">
+            <a:pPr marL="566737" indent="-457200" algn="just" eaLnBrk="1" fontAlgn="auto" hangingPunct="1">
               <a:lnSpc>
                 <a:spcPct val="93000"/>
               </a:lnSpc>
@@ -22364,8 +22422,96 @@
                 <a:latin typeface="Times New Roman" panose="02020603050405020304" pitchFamily="18" charset="0"/>
                 <a:cs typeface="Times New Roman" panose="02020603050405020304" pitchFamily="18" charset="0"/>
               </a:rPr>
-              <a:t>In market there are very few template or any complete web base application which provide all the needs of any organisations.</a:t>
+              <a:t>Survey 1</a:t>
             </a:r>
+          </a:p>
+          <a:p>
+            <a:pPr marL="109537" indent="0" algn="just" eaLnBrk="1" fontAlgn="auto" hangingPunct="1">
+              <a:lnSpc>
+                <a:spcPct val="93000"/>
+              </a:lnSpc>
+              <a:spcBef>
+                <a:spcPts val="0"/>
+              </a:spcBef>
+              <a:spcAft>
+                <a:spcPts val="1413"/>
+              </a:spcAft>
+              <a:defRPr/>
+            </a:pPr>
+            <a:r>
+              <a:rPr lang="en-IN" altLang="en-US" sz="2400" dirty="0">
+                <a:latin typeface="Times New Roman" panose="02020603050405020304" pitchFamily="18" charset="0"/>
+                <a:cs typeface="Times New Roman" panose="02020603050405020304" pitchFamily="18" charset="0"/>
+              </a:rPr>
+              <a:t>	In market there are very few template or any complete web base 	application which provide all the needs of any organisations. But there 	was a drawback that only admin have the access to it. Admin have to 	feed every single entry into it.</a:t>
+            </a:r>
+          </a:p>
+          <a:p>
+            <a:pPr marL="136524" lvl="1" algn="just" eaLnBrk="1" fontAlgn="auto" hangingPunct="1">
+              <a:lnSpc>
+                <a:spcPct val="93000"/>
+              </a:lnSpc>
+              <a:spcBef>
+                <a:spcPts val="0"/>
+              </a:spcBef>
+              <a:spcAft>
+                <a:spcPts val="1413"/>
+              </a:spcAft>
+              <a:defRPr/>
+            </a:pPr>
+            <a:r>
+              <a:rPr lang="en-IN" altLang="en-US" sz="1600" dirty="0">
+                <a:latin typeface="Times New Roman" panose="02020603050405020304" pitchFamily="18" charset="0"/>
+                <a:cs typeface="Times New Roman" panose="02020603050405020304" pitchFamily="18" charset="0"/>
+              </a:rPr>
+              <a:t>	Link: https://github.com/darylnauman/expense-reimbursement-system.git</a:t>
+            </a:r>
+          </a:p>
+          <a:p>
+            <a:pPr marL="136524" lvl="1" algn="just" eaLnBrk="1" fontAlgn="auto" hangingPunct="1">
+              <a:lnSpc>
+                <a:spcPct val="93000"/>
+              </a:lnSpc>
+              <a:spcBef>
+                <a:spcPts val="0"/>
+              </a:spcBef>
+              <a:spcAft>
+                <a:spcPts val="1413"/>
+              </a:spcAft>
+              <a:defRPr/>
+            </a:pPr>
+            <a:r>
+              <a:rPr lang="en-IN" altLang="en-US" sz="1600" dirty="0">
+                <a:latin typeface="Times New Roman" panose="02020603050405020304" pitchFamily="18" charset="0"/>
+                <a:cs typeface="Times New Roman" panose="02020603050405020304" pitchFamily="18" charset="0"/>
+              </a:rPr>
+              <a:t>		https://</a:t>
+            </a:r>
+            <a:r>
+              <a:rPr lang="en-IN" altLang="en-US" sz="1600" dirty="0" err="1">
+                <a:latin typeface="Times New Roman" panose="02020603050405020304" pitchFamily="18" charset="0"/>
+                <a:cs typeface="Times New Roman" panose="02020603050405020304" pitchFamily="18" charset="0"/>
+              </a:rPr>
+              <a:t>github.com</a:t>
+            </a:r>
+            <a:r>
+              <a:rPr lang="en-IN" altLang="en-US" sz="1600" dirty="0">
+                <a:latin typeface="Times New Roman" panose="02020603050405020304" pitchFamily="18" charset="0"/>
+                <a:cs typeface="Times New Roman" panose="02020603050405020304" pitchFamily="18" charset="0"/>
+              </a:rPr>
+              <a:t>/rupeshg98/</a:t>
+            </a:r>
+            <a:r>
+              <a:rPr lang="en-IN" altLang="en-US" sz="1600" dirty="0" err="1">
+                <a:latin typeface="Times New Roman" panose="02020603050405020304" pitchFamily="18" charset="0"/>
+                <a:cs typeface="Times New Roman" panose="02020603050405020304" pitchFamily="18" charset="0"/>
+              </a:rPr>
+              <a:t>EmployeeReimbursementSystem.git</a:t>
+            </a:r>
+            <a:endParaRPr lang="en-IN" altLang="en-US" sz="1600" dirty="0">
+              <a:latin typeface="Times New Roman" panose="02020603050405020304" pitchFamily="18" charset="0"/>
+              <a:cs typeface="Times New Roman" panose="02020603050405020304" pitchFamily="18" charset="0"/>
+            </a:endParaRPr>
           </a:p>
           <a:p>
             <a:pPr marL="566737" indent="-457200" eaLnBrk="1" fontAlgn="auto" hangingPunct="1">
@@ -22387,11 +22533,11 @@
                 <a:latin typeface="Times New Roman" panose="02020603050405020304" pitchFamily="18" charset="0"/>
                 <a:cs typeface="Times New Roman" panose="02020603050405020304" pitchFamily="18" charset="0"/>
               </a:rPr>
-              <a:t>Currently we found some existing web based application which help the organisation to maintain records.</a:t>
+              <a:t>Survey 2</a:t>
             </a:r>
           </a:p>
           <a:p>
-            <a:pPr marL="566737" indent="-457200" eaLnBrk="1" fontAlgn="auto" hangingPunct="1">
+            <a:pPr marL="109537" indent="0" algn="just" eaLnBrk="1" fontAlgn="auto" hangingPunct="1">
               <a:lnSpc>
                 <a:spcPct val="93000"/>
               </a:lnSpc>
@@ -22401,8 +22547,6 @@
               <a:spcAft>
                 <a:spcPts val="1413"/>
               </a:spcAft>
-              <a:buFont typeface="Arial" panose="020B0604020202020204" pitchFamily="34" charset="0"/>
-              <a:buChar char="•"/>
               <a:defRPr/>
             </a:pPr>
             <a:r>
@@ -22410,11 +22554,11 @@
                 <a:latin typeface="Times New Roman" panose="02020603050405020304" pitchFamily="18" charset="0"/>
                 <a:cs typeface="Times New Roman" panose="02020603050405020304" pitchFamily="18" charset="0"/>
               </a:rPr>
-              <a:t>But there was a drawback that only admin have the access to it. Admin have to feed every single entry into it.</a:t>
+              <a:t>	 While searching for any other application that serves our needs, we 	came across another application written in Java. The problem was 	application was running on legacy code, which hard works with it or 	makes some improvements in it.</a:t>
             </a:r>
           </a:p>
           <a:p>
-            <a:pPr marL="566737" indent="-457200" eaLnBrk="1" fontAlgn="auto" hangingPunct="1">
+            <a:pPr marL="109537" indent="0" algn="just" eaLnBrk="1" fontAlgn="auto" hangingPunct="1">
               <a:lnSpc>
                 <a:spcPct val="93000"/>
               </a:lnSpc>
@@ -22424,17 +22568,54 @@
               <a:spcAft>
                 <a:spcPts val="1413"/>
               </a:spcAft>
-              <a:buFont typeface="Arial" panose="020B0604020202020204" pitchFamily="34" charset="0"/>
-              <a:buChar char="•"/>
               <a:defRPr/>
             </a:pPr>
             <a:r>
-              <a:rPr lang="en-IN" altLang="en-US" sz="2400" dirty="0">
+              <a:rPr lang="en-IN" altLang="en-US" sz="1600" dirty="0">
                 <a:latin typeface="Times New Roman" panose="02020603050405020304" pitchFamily="18" charset="0"/>
                 <a:cs typeface="Times New Roman" panose="02020603050405020304" pitchFamily="18" charset="0"/>
               </a:rPr>
-              <a:t>In our project we have overcome to this problem, registered student or staff can have partial access to our webpage in which they can feed there enrolled course itself and which will be further verified by the admin for final reimbursement.</a:t>
+              <a:t>	Link: https://</a:t>
             </a:r>
+            <a:r>
+              <a:rPr lang="en-IN" altLang="en-US" sz="1600" dirty="0" err="1">
+                <a:latin typeface="Times New Roman" panose="02020603050405020304" pitchFamily="18" charset="0"/>
+                <a:cs typeface="Times New Roman" panose="02020603050405020304" pitchFamily="18" charset="0"/>
+              </a:rPr>
+              <a:t>github.com</a:t>
+            </a:r>
+            <a:r>
+              <a:rPr lang="en-IN" altLang="en-US" sz="1600" dirty="0">
+                <a:latin typeface="Times New Roman" panose="02020603050405020304" pitchFamily="18" charset="0"/>
+                <a:cs typeface="Times New Roman" panose="02020603050405020304" pitchFamily="18" charset="0"/>
+              </a:rPr>
+              <a:t>/</a:t>
+            </a:r>
+            <a:r>
+              <a:rPr lang="en-IN" altLang="en-US" sz="1600" dirty="0" err="1">
+                <a:latin typeface="Times New Roman" panose="02020603050405020304" pitchFamily="18" charset="0"/>
+                <a:cs typeface="Times New Roman" panose="02020603050405020304" pitchFamily="18" charset="0"/>
+              </a:rPr>
+              <a:t>jckuhl</a:t>
+            </a:r>
+            <a:r>
+              <a:rPr lang="en-IN" altLang="en-US" sz="1600" dirty="0">
+                <a:latin typeface="Times New Roman" panose="02020603050405020304" pitchFamily="18" charset="0"/>
+                <a:cs typeface="Times New Roman" panose="02020603050405020304" pitchFamily="18" charset="0"/>
+              </a:rPr>
+              <a:t>/Employee-Reimbursement-</a:t>
+            </a:r>
+            <a:r>
+              <a:rPr lang="en-IN" altLang="en-US" sz="1600" dirty="0" err="1">
+                <a:latin typeface="Times New Roman" panose="02020603050405020304" pitchFamily="18" charset="0"/>
+                <a:cs typeface="Times New Roman" panose="02020603050405020304" pitchFamily="18" charset="0"/>
+              </a:rPr>
+              <a:t>System.git</a:t>
+            </a:r>
+            <a:endParaRPr lang="en-IN" altLang="en-US" sz="1600" dirty="0">
+              <a:latin typeface="Times New Roman" panose="02020603050405020304" pitchFamily="18" charset="0"/>
+              <a:cs typeface="Times New Roman" panose="02020603050405020304" pitchFamily="18" charset="0"/>
+            </a:endParaRPr>
           </a:p>
         </p:txBody>
       </p:sp>

</xml_diff>